<commit_message>
module 1 first draft
</commit_message>
<xml_diff>
--- a/module-1/1.5-demo.pptx
+++ b/module-1/1.5-demo.pptx
@@ -15,7 +15,7 @@
   <p:sldIdLst>
     <p:sldId id="285" r:id="rId4"/>
     <p:sldId id="324" r:id="rId5"/>
-    <p:sldId id="323" r:id="rId6"/>
+    <p:sldId id="326" r:id="rId6"/>
     <p:sldId id="325" r:id="rId7"/>
   </p:sldIdLst>
   <p:sldSz cx="12192000" cy="6858000"/>
@@ -245,7 +245,7 @@
           <a:p>
             <a:fld id="{9DAF894A-70DC-1344-8793-A2A3FB288CFE}" type="datetimeFigureOut">
               <a:rPr lang="en-US" smtClean="0"/>
-              <a:t>10/18/20</a:t>
+              <a:t>10/19/20</a:t>
             </a:fld>
             <a:endParaRPr lang="en-US"/>
           </a:p>
@@ -422,7 +422,7 @@
           <a:p>
             <a:fld id="{1FC4BE61-C03A-824C-A357-AB09725BFA9E}" type="datetimeFigureOut">
               <a:rPr lang="en-US" smtClean="0"/>
-              <a:t>10/18/20</a:t>
+              <a:t>10/19/20</a:t>
             </a:fld>
             <a:endParaRPr lang="en-US"/>
           </a:p>
@@ -3964,16 +3964,12 @@
               </a:lnSpc>
             </a:pPr>
             <a:r>
-              <a:rPr lang="en-US" sz="4800">
+              <a:rPr lang="en-US" sz="4800" dirty="0">
                 <a:latin typeface="Arial" panose="020B0604020202020204" pitchFamily="34" charset="0"/>
                 <a:cs typeface="Arial" panose="020B0604020202020204" pitchFamily="34" charset="0"/>
               </a:rPr>
-              <a:t>Demo</a:t>
-            </a:r>
-            <a:endParaRPr lang="en-US" sz="4800" dirty="0">
-              <a:latin typeface="Arial" panose="020B0604020202020204" pitchFamily="34" charset="0"/>
-              <a:cs typeface="Arial" panose="020B0604020202020204" pitchFamily="34" charset="0"/>
-            </a:endParaRPr>
+              <a:t>ML in Python</a:t>
+            </a:r>
           </a:p>
           <a:p>
             <a:pPr algn="l">
@@ -3986,7 +3982,21 @@
                 <a:latin typeface="Arial" panose="020B0604020202020204" pitchFamily="34" charset="0"/>
                 <a:cs typeface="Arial" panose="020B0604020202020204" pitchFamily="34" charset="0"/>
               </a:rPr>
-              <a:t>A hands-on tutorial</a:t>
+              <a:t>A simple ML pipeline in </a:t>
+            </a:r>
+            <a:r>
+              <a:rPr lang="en-US" sz="3600" b="0" dirty="0" err="1">
+                <a:latin typeface="Arial" panose="020B0604020202020204" pitchFamily="34" charset="0"/>
+                <a:cs typeface="Arial" panose="020B0604020202020204" pitchFamily="34" charset="0"/>
+              </a:rPr>
+              <a:t>Jupyter</a:t>
+            </a:r>
+            <a:r>
+              <a:rPr lang="en-US" sz="3600" b="0" dirty="0">
+                <a:latin typeface="Arial" panose="020B0604020202020204" pitchFamily="34" charset="0"/>
+                <a:cs typeface="Arial" panose="020B0604020202020204" pitchFamily="34" charset="0"/>
+              </a:rPr>
+              <a:t> Lab</a:t>
             </a:r>
             <a:endParaRPr lang="en-US" sz="3600" b="0" i="0" dirty="0">
               <a:latin typeface="Arial" panose="020B0604020202020204" pitchFamily="34" charset="0"/>
@@ -4046,7 +4056,10 @@
           <a:bodyPr/>
           <a:lstStyle/>
           <a:p>
-            <a:endParaRPr lang="en-US" dirty="0"/>
+            <a:r>
+              <a:rPr lang="en-US" dirty="0"/>
+              <a:t>Hardware and Software Preparation</a:t>
+            </a:r>
           </a:p>
         </p:txBody>
       </p:sp>
@@ -4070,6 +4083,58 @@
         <p:txBody>
           <a:bodyPr/>
           <a:lstStyle/>
+          <a:p>
+            <a:r>
+              <a:rPr lang="en-US" dirty="0"/>
+              <a:t>You will need a laptop to get the most of the session, with Python (3.7 or higher) installed, along with </a:t>
+            </a:r>
+            <a:r>
+              <a:rPr lang="en-US" dirty="0" err="1"/>
+              <a:t>numpy</a:t>
+            </a:r>
+            <a:r>
+              <a:rPr lang="en-US" dirty="0"/>
+              <a:t>, </a:t>
+            </a:r>
+            <a:r>
+              <a:rPr lang="en-US" dirty="0" err="1"/>
+              <a:t>scipy</a:t>
+            </a:r>
+            <a:r>
+              <a:rPr lang="en-US" dirty="0"/>
+              <a:t>, </a:t>
+            </a:r>
+            <a:r>
+              <a:rPr lang="en-US" dirty="0" err="1"/>
+              <a:t>sklearn</a:t>
+            </a:r>
+            <a:r>
+              <a:rPr lang="en-US" dirty="0"/>
+              <a:t>, and </a:t>
+            </a:r>
+            <a:r>
+              <a:rPr lang="en-US" dirty="0" err="1"/>
+              <a:t>pytorch</a:t>
+            </a:r>
+            <a:r>
+              <a:rPr lang="en-US" dirty="0"/>
+              <a:t>.</a:t>
+            </a:r>
+          </a:p>
+          <a:p>
+            <a:r>
+              <a:rPr lang="en-US" dirty="0"/>
+              <a:t>You also need to have the </a:t>
+            </a:r>
+            <a:r>
+              <a:rPr lang="en-US" dirty="0" err="1"/>
+              <a:t>jupyter</a:t>
+            </a:r>
+            <a:r>
+              <a:rPr lang="en-US" dirty="0"/>
+              <a:t> notebook installed</a:t>
+            </a:r>
+          </a:p>
           <a:p>
             <a:endParaRPr lang="en-US" dirty="0"/>
           </a:p>
@@ -4107,10 +4172,10 @@
       </p:grpSpPr>
       <p:sp>
         <p:nvSpPr>
-          <p:cNvPr id="5" name="Title 4">
+          <p:cNvPr id="3" name="Title 2">
             <a:extLst>
               <a:ext uri="{FF2B5EF4-FFF2-40B4-BE49-F238E27FC236}">
-                <a16:creationId xmlns:a16="http://schemas.microsoft.com/office/drawing/2014/main" id="{3C485A7A-6D4C-6449-95D3-D40C9E876BB6}"/>
+                <a16:creationId xmlns:a16="http://schemas.microsoft.com/office/drawing/2014/main" id="{16AD07B5-C1B2-A54D-8BA1-61D32E7B3B98}"/>
               </a:ext>
             </a:extLst>
           </p:cNvPr>
@@ -4118,7 +4183,7 @@
             <a:spLocks noGrp="1"/>
           </p:cNvSpPr>
           <p:nvPr>
-            <p:ph type="ctrTitle"/>
+            <p:ph type="title"/>
           </p:nvPr>
         </p:nvSpPr>
         <p:spPr/>
@@ -4126,6 +4191,69 @@
           <a:bodyPr/>
           <a:lstStyle/>
           <a:p>
+            <a:r>
+              <a:rPr lang="en-US" dirty="0"/>
+              <a:t>Installation instructions</a:t>
+            </a:r>
+          </a:p>
+        </p:txBody>
+      </p:sp>
+      <p:sp>
+        <p:nvSpPr>
+          <p:cNvPr id="4" name="Content Placeholder 3">
+            <a:extLst>
+              <a:ext uri="{FF2B5EF4-FFF2-40B4-BE49-F238E27FC236}">
+                <a16:creationId xmlns:a16="http://schemas.microsoft.com/office/drawing/2014/main" id="{325521D6-C804-5E47-B5FB-304222FCDE49}"/>
+              </a:ext>
+            </a:extLst>
+          </p:cNvPr>
+          <p:cNvSpPr>
+            <a:spLocks noGrp="1"/>
+          </p:cNvSpPr>
+          <p:nvPr>
+            <p:ph idx="1"/>
+          </p:nvPr>
+        </p:nvSpPr>
+        <p:spPr/>
+        <p:txBody>
+          <a:bodyPr/>
+          <a:lstStyle/>
+          <a:p>
+            <a:r>
+              <a:rPr lang="en-US" dirty="0"/>
+              <a:t>For new Python users, install the </a:t>
+            </a:r>
+            <a:r>
+              <a:rPr lang="en-US" u="sng" dirty="0">
+                <a:hlinkClick r:id="rId2"/>
+              </a:rPr>
+              <a:t>Anaconda</a:t>
+            </a:r>
+            <a:r>
+              <a:rPr lang="en-US" dirty="0"/>
+              <a:t> distribution</a:t>
+            </a:r>
+          </a:p>
+          <a:p>
+            <a:pPr lvl="1"/>
+            <a:r>
+              <a:rPr lang="en-US" dirty="0" err="1"/>
+              <a:t>conda</a:t>
+            </a:r>
+            <a:r>
+              <a:rPr lang="en-US" dirty="0"/>
+              <a:t> install </a:t>
+            </a:r>
+            <a:r>
+              <a:rPr lang="en-US" dirty="0" err="1"/>
+              <a:t>jupyterlab</a:t>
+            </a:r>
+            <a:endParaRPr lang="en-US" dirty="0"/>
+          </a:p>
+          <a:p>
+            <a:endParaRPr lang="en-US" dirty="0"/>
+          </a:p>
+          <a:p>
             <a:endParaRPr lang="en-US" dirty="0"/>
           </a:p>
         </p:txBody>
@@ -4133,7 +4261,7 @@
     </p:spTree>
     <p:extLst>
       <p:ext uri="{BB962C8B-B14F-4D97-AF65-F5344CB8AC3E}">
-        <p14:creationId xmlns:p14="http://schemas.microsoft.com/office/powerpoint/2010/main" val="325368673"/>
+        <p14:creationId xmlns:p14="http://schemas.microsoft.com/office/powerpoint/2010/main" val="1497207432"/>
       </p:ext>
     </p:extLst>
   </p:cSld>
@@ -4181,35 +4309,45 @@
           <a:bodyPr/>
           <a:lstStyle/>
           <a:p>
-            <a:endParaRPr lang="en-US"/>
+            <a:r>
+              <a:rPr lang="en-US" dirty="0"/>
+              <a:t>Demo of a Simple ML Pipeline</a:t>
+            </a:r>
           </a:p>
         </p:txBody>
       </p:sp>
-      <p:sp>
-        <p:nvSpPr>
-          <p:cNvPr id="5" name="Content Placeholder 4">
+      <p:pic>
+        <p:nvPicPr>
+          <p:cNvPr id="3" name="Content Placeholder 2">
             <a:extLst>
               <a:ext uri="{FF2B5EF4-FFF2-40B4-BE49-F238E27FC236}">
-                <a16:creationId xmlns:a16="http://schemas.microsoft.com/office/drawing/2014/main" id="{EF7A17DA-1B11-274A-8F10-BA65505F2A42}"/>
+                <a16:creationId xmlns:a16="http://schemas.microsoft.com/office/drawing/2014/main" id="{27A00741-103F-5248-818C-E8D07F14B3BA}"/>
               </a:ext>
             </a:extLst>
           </p:cNvPr>
-          <p:cNvSpPr>
-            <a:spLocks noGrp="1"/>
-          </p:cNvSpPr>
+          <p:cNvPicPr>
+            <a:picLocks noGrp="1" noChangeAspect="1"/>
+          </p:cNvPicPr>
           <p:nvPr>
             <p:ph idx="1"/>
           </p:nvPr>
-        </p:nvSpPr>
-        <p:spPr/>
-        <p:txBody>
-          <a:bodyPr/>
-          <a:lstStyle/>
-          <a:p>
-            <a:endParaRPr lang="en-US"/>
-          </a:p>
-        </p:txBody>
-      </p:sp>
+        </p:nvPicPr>
+        <p:blipFill>
+          <a:blip r:embed="rId2"/>
+          <a:stretch>
+            <a:fillRect/>
+          </a:stretch>
+        </p:blipFill>
+        <p:spPr>
+          <a:xfrm>
+            <a:off x="2529703" y="1543050"/>
+            <a:ext cx="7132594" cy="4157663"/>
+          </a:xfrm>
+          <a:prstGeom prst="rect">
+            <a:avLst/>
+          </a:prstGeom>
+        </p:spPr>
+      </p:pic>
     </p:spTree>
     <p:extLst>
       <p:ext uri="{BB962C8B-B14F-4D97-AF65-F5344CB8AC3E}">

</xml_diff>